<commit_message>
keeping slides consistent from earlier pres
</commit_message>
<xml_diff>
--- a/13_abundance.pptx
+++ b/13_abundance.pptx
@@ -5,7 +5,7 @@
     <p:sldMasterId id="2147483648" r:id="rId1"/>
   </p:sldMasterIdLst>
   <p:notesMasterIdLst>
-    <p:notesMasterId r:id="rId11"/>
+    <p:notesMasterId r:id="rId12"/>
   </p:notesMasterIdLst>
   <p:sldIdLst>
     <p:sldId id="338" r:id="rId2"/>
@@ -15,8 +15,9 @@
     <p:sldId id="260" r:id="rId6"/>
     <p:sldId id="1057" r:id="rId7"/>
     <p:sldId id="1058" r:id="rId8"/>
-    <p:sldId id="282" r:id="rId9"/>
+    <p:sldId id="671" r:id="rId9"/>
     <p:sldId id="261" r:id="rId10"/>
+    <p:sldId id="1060" r:id="rId11"/>
   </p:sldIdLst>
   <p:sldSz cx="12192000" cy="6858000"/>
   <p:notesSz cx="6858000" cy="9144000"/>
@@ -205,7 +206,7 @@
           <a:p>
             <a:fld id="{B5F2DB6C-4A38-6D4B-B33C-06A9525C60E0}" type="datetimeFigureOut">
               <a:rPr lang="en-US" smtClean="0"/>
-              <a:t>11/12/19</a:t>
+              <a:t>11/19/19</a:t>
             </a:fld>
             <a:endParaRPr lang="en-US"/>
           </a:p>
@@ -1339,10 +1340,7 @@
           <a:bodyPr/>
           <a:lstStyle/>
           <a:p>
-            <a:r>
-              <a:rPr lang="en-US" dirty="0"/>
-              <a:t>If there is time / interest we </a:t>
-            </a:r>
+            <a:endParaRPr lang="en-US" dirty="0"/>
           </a:p>
         </p:txBody>
       </p:sp>
@@ -1363,7 +1361,7 @@
           <a:p>
             <a:fld id="{5C7E941B-46F7-7A4E-8D95-47CF642C97AC}" type="slidenum">
               <a:rPr lang="en-US" smtClean="0"/>
-              <a:t>8</a:t>
+              <a:t>9</a:t>
             </a:fld>
             <a:endParaRPr lang="en-US"/>
           </a:p>
@@ -1372,7 +1370,7 @@
     </p:spTree>
     <p:extLst>
       <p:ext uri="{BB962C8B-B14F-4D97-AF65-F5344CB8AC3E}">
-        <p14:creationId xmlns:p14="http://schemas.microsoft.com/office/powerpoint/2010/main" val="1214878217"/>
+        <p14:creationId xmlns:p14="http://schemas.microsoft.com/office/powerpoint/2010/main" val="232080002"/>
       </p:ext>
     </p:extLst>
   </p:cSld>
@@ -1437,7 +1435,7 @@
             <a:spLocks noGrp="1"/>
           </p:cNvSpPr>
           <p:nvPr>
-            <p:ph type="sldNum" sz="quarter" idx="5"/>
+            <p:ph type="sldNum" sz="quarter" idx="10"/>
           </p:nvPr>
         </p:nvSpPr>
         <p:spPr/>
@@ -1445,9 +1443,9 @@
           <a:bodyPr/>
           <a:lstStyle/>
           <a:p>
-            <a:fld id="{5C7E941B-46F7-7A4E-8D95-47CF642C97AC}" type="slidenum">
+            <a:fld id="{75433488-A115-A44B-AD30-AEC6ACF5D605}" type="slidenum">
               <a:rPr lang="en-US" smtClean="0"/>
-              <a:t>9</a:t>
+              <a:t>10</a:t>
             </a:fld>
             <a:endParaRPr lang="en-US"/>
           </a:p>
@@ -1456,7 +1454,7 @@
     </p:spTree>
     <p:extLst>
       <p:ext uri="{BB962C8B-B14F-4D97-AF65-F5344CB8AC3E}">
-        <p14:creationId xmlns:p14="http://schemas.microsoft.com/office/powerpoint/2010/main" val="232080002"/>
+        <p14:creationId xmlns:p14="http://schemas.microsoft.com/office/powerpoint/2010/main" val="738348439"/>
       </p:ext>
     </p:extLst>
   </p:cSld>
@@ -1613,7 +1611,7 @@
           <a:p>
             <a:fld id="{EA1631E3-3A1A-C941-835B-F95D9226826E}" type="datetimeFigureOut">
               <a:rPr lang="en-US" smtClean="0"/>
-              <a:t>11/12/19</a:t>
+              <a:t>11/19/19</a:t>
             </a:fld>
             <a:endParaRPr lang="en-US"/>
           </a:p>
@@ -1811,7 +1809,7 @@
           <a:p>
             <a:fld id="{EA1631E3-3A1A-C941-835B-F95D9226826E}" type="datetimeFigureOut">
               <a:rPr lang="en-US" smtClean="0"/>
-              <a:t>11/12/19</a:t>
+              <a:t>11/19/19</a:t>
             </a:fld>
             <a:endParaRPr lang="en-US"/>
           </a:p>
@@ -2019,7 +2017,7 @@
           <a:p>
             <a:fld id="{EA1631E3-3A1A-C941-835B-F95D9226826E}" type="datetimeFigureOut">
               <a:rPr lang="en-US" smtClean="0"/>
-              <a:t>11/12/19</a:t>
+              <a:t>11/19/19</a:t>
             </a:fld>
             <a:endParaRPr lang="en-US"/>
           </a:p>
@@ -2233,7 +2231,7 @@
           <a:p>
             <a:fld id="{EA1631E3-3A1A-C941-835B-F95D9226826E}" type="datetimeFigureOut">
               <a:rPr lang="en-US" smtClean="0"/>
-              <a:t>11/12/19</a:t>
+              <a:t>11/19/19</a:t>
             </a:fld>
             <a:endParaRPr lang="en-US"/>
           </a:p>
@@ -2508,7 +2506,7 @@
           <a:p>
             <a:fld id="{EA1631E3-3A1A-C941-835B-F95D9226826E}" type="datetimeFigureOut">
               <a:rPr lang="en-US" smtClean="0"/>
-              <a:t>11/12/19</a:t>
+              <a:t>11/19/19</a:t>
             </a:fld>
             <a:endParaRPr lang="en-US"/>
           </a:p>
@@ -2773,7 +2771,7 @@
           <a:p>
             <a:fld id="{EA1631E3-3A1A-C941-835B-F95D9226826E}" type="datetimeFigureOut">
               <a:rPr lang="en-US" smtClean="0"/>
-              <a:t>11/12/19</a:t>
+              <a:t>11/19/19</a:t>
             </a:fld>
             <a:endParaRPr lang="en-US"/>
           </a:p>
@@ -3185,7 +3183,7 @@
           <a:p>
             <a:fld id="{EA1631E3-3A1A-C941-835B-F95D9226826E}" type="datetimeFigureOut">
               <a:rPr lang="en-US" smtClean="0"/>
-              <a:t>11/12/19</a:t>
+              <a:t>11/19/19</a:t>
             </a:fld>
             <a:endParaRPr lang="en-US"/>
           </a:p>
@@ -3326,7 +3324,7 @@
           <a:p>
             <a:fld id="{EA1631E3-3A1A-C941-835B-F95D9226826E}" type="datetimeFigureOut">
               <a:rPr lang="en-US" smtClean="0"/>
-              <a:t>11/12/19</a:t>
+              <a:t>11/19/19</a:t>
             </a:fld>
             <a:endParaRPr lang="en-US"/>
           </a:p>
@@ -3439,7 +3437,7 @@
           <a:p>
             <a:fld id="{EA1631E3-3A1A-C941-835B-F95D9226826E}" type="datetimeFigureOut">
               <a:rPr lang="en-US" smtClean="0"/>
-              <a:t>11/12/19</a:t>
+              <a:t>11/19/19</a:t>
             </a:fld>
             <a:endParaRPr lang="en-US"/>
           </a:p>
@@ -3750,7 +3748,7 @@
           <a:p>
             <a:fld id="{EA1631E3-3A1A-C941-835B-F95D9226826E}" type="datetimeFigureOut">
               <a:rPr lang="en-US" smtClean="0"/>
-              <a:t>11/12/19</a:t>
+              <a:t>11/19/19</a:t>
             </a:fld>
             <a:endParaRPr lang="en-US"/>
           </a:p>
@@ -4038,7 +4036,7 @@
           <a:p>
             <a:fld id="{EA1631E3-3A1A-C941-835B-F95D9226826E}" type="datetimeFigureOut">
               <a:rPr lang="en-US" smtClean="0"/>
-              <a:t>11/12/19</a:t>
+              <a:t>11/19/19</a:t>
             </a:fld>
             <a:endParaRPr lang="en-US"/>
           </a:p>
@@ -4279,7 +4277,7 @@
           <a:p>
             <a:fld id="{EA1631E3-3A1A-C941-835B-F95D9226826E}" type="datetimeFigureOut">
               <a:rPr lang="en-US" smtClean="0"/>
-              <a:t>11/12/19</a:t>
+              <a:t>11/19/19</a:t>
             </a:fld>
             <a:endParaRPr lang="en-US"/>
           </a:p>
@@ -4963,6 +4961,290 @@
 </p:sld>
 </file>
 
+<file path=ppt/slides/slide10.xml><?xml version="1.0" encoding="utf-8"?>
+<p:sld xmlns:a="http://schemas.openxmlformats.org/drawingml/2006/main" xmlns:r="http://schemas.openxmlformats.org/officeDocument/2006/relationships" xmlns:p="http://schemas.openxmlformats.org/presentationml/2006/main">
+  <p:cSld>
+    <p:spTree>
+      <p:nvGrpSpPr>
+        <p:cNvPr id="1" name=""/>
+        <p:cNvGrpSpPr/>
+        <p:nvPr/>
+      </p:nvGrpSpPr>
+      <p:grpSpPr>
+        <a:xfrm>
+          <a:off x="0" y="0"/>
+          <a:ext cx="0" cy="0"/>
+          <a:chOff x="0" y="0"/>
+          <a:chExt cx="0" cy="0"/>
+        </a:xfrm>
+      </p:grpSpPr>
+      <p:pic>
+        <p:nvPicPr>
+          <p:cNvPr id="14337" name="Picture 6" descr="CLO for PPT.eps"/>
+          <p:cNvPicPr>
+            <a:picLocks noChangeAspect="1"/>
+          </p:cNvPicPr>
+          <p:nvPr/>
+        </p:nvPicPr>
+        <p:blipFill>
+          <a:blip r:embed="rId3">
+            <a:extLst>
+              <a:ext uri="{28A0092B-C50C-407E-A947-70E740481C1C}">
+                <a14:useLocalDpi xmlns:a14="http://schemas.microsoft.com/office/drawing/2010/main" val="0"/>
+              </a:ext>
+            </a:extLst>
+          </a:blip>
+          <a:srcRect/>
+          <a:stretch>
+            <a:fillRect/>
+          </a:stretch>
+        </p:blipFill>
+        <p:spPr bwMode="auto">
+          <a:xfrm>
+            <a:off x="3179762" y="5486400"/>
+            <a:ext cx="5832475" cy="622300"/>
+          </a:xfrm>
+          <a:prstGeom prst="rect">
+            <a:avLst/>
+          </a:prstGeom>
+          <a:noFill/>
+          <a:ln>
+            <a:noFill/>
+          </a:ln>
+          <a:extLst>
+            <a:ext uri="{909E8E84-426E-40DD-AFC4-6F175D3DCCD1}">
+              <a14:hiddenFill xmlns:a14="http://schemas.microsoft.com/office/drawing/2010/main">
+                <a:solidFill>
+                  <a:srgbClr val="FFFFFF"/>
+                </a:solidFill>
+              </a14:hiddenFill>
+            </a:ext>
+            <a:ext uri="{91240B29-F687-4F45-9708-019B960494DF}">
+              <a14:hiddenLine xmlns:a14="http://schemas.microsoft.com/office/drawing/2010/main" w="9525">
+                <a:solidFill>
+                  <a:srgbClr val="000000"/>
+                </a:solidFill>
+                <a:miter lim="800000"/>
+                <a:headEnd/>
+                <a:tailEnd/>
+              </a14:hiddenLine>
+            </a:ext>
+          </a:extLst>
+        </p:spPr>
+      </p:pic>
+      <p:sp>
+        <p:nvSpPr>
+          <p:cNvPr id="6" name="Rectangle 5"/>
+          <p:cNvSpPr/>
+          <p:nvPr/>
+        </p:nvSpPr>
+        <p:spPr>
+          <a:xfrm>
+            <a:off x="-1" y="6361112"/>
+            <a:ext cx="12192000" cy="496888"/>
+          </a:xfrm>
+          <a:prstGeom prst="rect">
+            <a:avLst/>
+          </a:prstGeom>
+          <a:solidFill>
+            <a:schemeClr val="tx1"/>
+          </a:solidFill>
+          <a:ln>
+            <a:noFill/>
+          </a:ln>
+          <a:effectLst/>
+        </p:spPr>
+        <p:style>
+          <a:lnRef idx="1">
+            <a:schemeClr val="accent1"/>
+          </a:lnRef>
+          <a:fillRef idx="3">
+            <a:schemeClr val="accent1"/>
+          </a:fillRef>
+          <a:effectRef idx="2">
+            <a:schemeClr val="accent1"/>
+          </a:effectRef>
+          <a:fontRef idx="minor">
+            <a:schemeClr val="lt1"/>
+          </a:fontRef>
+        </p:style>
+        <p:txBody>
+          <a:bodyPr anchor="ctr"/>
+          <a:lstStyle/>
+          <a:p>
+            <a:pPr algn="ctr">
+              <a:defRPr/>
+            </a:pPr>
+            <a:endParaRPr lang="ja-JP" altLang="en-US">
+              <a:solidFill>
+                <a:srgbClr val="FFFFFF"/>
+              </a:solidFill>
+              <a:latin typeface="Calibri Light" panose="020F0302020204030204" pitchFamily="34" charset="0"/>
+              <a:ea typeface="ＭＳ Ｐゴシック" charset="0"/>
+              <a:cs typeface="Calibri Light" panose="020F0302020204030204" pitchFamily="34" charset="0"/>
+            </a:endParaRPr>
+          </a:p>
+        </p:txBody>
+      </p:sp>
+      <p:grpSp>
+        <p:nvGrpSpPr>
+          <p:cNvPr id="5" name="Group 4">
+            <a:extLst>
+              <a:ext uri="{FF2B5EF4-FFF2-40B4-BE49-F238E27FC236}">
+                <a16:creationId xmlns:a16="http://schemas.microsoft.com/office/drawing/2014/main" id="{5AFF98C2-4955-9346-800E-5B1B1263E7E7}"/>
+              </a:ext>
+            </a:extLst>
+          </p:cNvPr>
+          <p:cNvGrpSpPr/>
+          <p:nvPr/>
+        </p:nvGrpSpPr>
+        <p:grpSpPr>
+          <a:xfrm>
+            <a:off x="1371600" y="1341140"/>
+            <a:ext cx="9331567" cy="2246769"/>
+            <a:chOff x="1371600" y="1341140"/>
+            <a:chExt cx="9331567" cy="2246769"/>
+          </a:xfrm>
+        </p:grpSpPr>
+        <p:pic>
+          <p:nvPicPr>
+            <p:cNvPr id="14" name="Picture 13"/>
+            <p:cNvPicPr>
+              <a:picLocks noChangeAspect="1"/>
+            </p:cNvPicPr>
+            <p:nvPr/>
+          </p:nvPicPr>
+          <p:blipFill>
+            <a:blip r:embed="rId4">
+              <a:extLst>
+                <a:ext uri="{28A0092B-C50C-407E-A947-70E740481C1C}">
+                  <a14:useLocalDpi xmlns:a14="http://schemas.microsoft.com/office/drawing/2010/main" val="0"/>
+                </a:ext>
+              </a:extLst>
+            </a:blip>
+            <a:stretch>
+              <a:fillRect/>
+            </a:stretch>
+          </p:blipFill>
+          <p:spPr>
+            <a:xfrm>
+              <a:off x="1371600" y="1578210"/>
+              <a:ext cx="4693646" cy="1828800"/>
+            </a:xfrm>
+            <a:prstGeom prst="rect">
+              <a:avLst/>
+            </a:prstGeom>
+          </p:spPr>
+        </p:pic>
+        <p:sp>
+          <p:nvSpPr>
+            <p:cNvPr id="2" name="TextBox 1">
+              <a:extLst>
+                <a:ext uri="{FF2B5EF4-FFF2-40B4-BE49-F238E27FC236}">
+                  <a16:creationId xmlns:a16="http://schemas.microsoft.com/office/drawing/2014/main" id="{65A1CA9B-FF78-D744-AE54-4C684EEEBB17}"/>
+                </a:ext>
+              </a:extLst>
+            </p:cNvPr>
+            <p:cNvSpPr txBox="1"/>
+            <p:nvPr/>
+          </p:nvSpPr>
+          <p:spPr>
+            <a:xfrm>
+              <a:off x="6102023" y="1341140"/>
+              <a:ext cx="4601144" cy="2246769"/>
+            </a:xfrm>
+            <a:prstGeom prst="rect">
+              <a:avLst/>
+            </a:prstGeom>
+            <a:noFill/>
+          </p:spPr>
+          <p:txBody>
+            <a:bodyPr wrap="square" rtlCol="0">
+              <a:spAutoFit/>
+            </a:bodyPr>
+            <a:lstStyle/>
+            <a:p>
+              <a:r>
+                <a:rPr lang="en-US" sz="7000" dirty="0">
+                  <a:solidFill>
+                    <a:srgbClr val="4CA800"/>
+                  </a:solidFill>
+                  <a:latin typeface="Tahoma" panose="020B0604030504040204" pitchFamily="34" charset="0"/>
+                  <a:ea typeface="Tahoma" panose="020B0604030504040204" pitchFamily="34" charset="0"/>
+                  <a:cs typeface="Tahoma" panose="020B0604030504040204" pitchFamily="34" charset="0"/>
+                </a:rPr>
+                <a:t>Best</a:t>
+              </a:r>
+            </a:p>
+            <a:p>
+              <a:r>
+                <a:rPr lang="en-US" sz="7000" dirty="0">
+                  <a:solidFill>
+                    <a:srgbClr val="4CA800"/>
+                  </a:solidFill>
+                  <a:latin typeface="Tahoma" panose="020B0604030504040204" pitchFamily="34" charset="0"/>
+                  <a:ea typeface="Tahoma" panose="020B0604030504040204" pitchFamily="34" charset="0"/>
+                  <a:cs typeface="Tahoma" panose="020B0604030504040204" pitchFamily="34" charset="0"/>
+                </a:rPr>
+                <a:t>Practices II</a:t>
+              </a:r>
+            </a:p>
+          </p:txBody>
+        </p:sp>
+      </p:grpSp>
+      <p:sp>
+        <p:nvSpPr>
+          <p:cNvPr id="7" name="TextBox 6">
+            <a:extLst>
+              <a:ext uri="{FF2B5EF4-FFF2-40B4-BE49-F238E27FC236}">
+                <a16:creationId xmlns:a16="http://schemas.microsoft.com/office/drawing/2014/main" id="{F970A262-E61F-6D43-9ABC-0F5CB22A3698}"/>
+              </a:ext>
+            </a:extLst>
+          </p:cNvPr>
+          <p:cNvSpPr txBox="1"/>
+          <p:nvPr/>
+        </p:nvSpPr>
+        <p:spPr>
+          <a:xfrm>
+            <a:off x="1488833" y="3462714"/>
+            <a:ext cx="8487508" cy="630942"/>
+          </a:xfrm>
+          <a:prstGeom prst="rect">
+            <a:avLst/>
+          </a:prstGeom>
+          <a:noFill/>
+        </p:spPr>
+        <p:txBody>
+          <a:bodyPr wrap="square" rtlCol="0">
+            <a:spAutoFit/>
+          </a:bodyPr>
+          <a:lstStyle/>
+          <a:p>
+            <a:pPr algn="ctr"/>
+            <a:r>
+              <a:rPr lang="en-US" sz="3500" dirty="0">
+                <a:latin typeface="Tahoma" panose="020B0604030504040204" pitchFamily="34" charset="0"/>
+                <a:ea typeface="Tahoma" panose="020B0604030504040204" pitchFamily="34" charset="0"/>
+                <a:cs typeface="Tahoma" panose="020B0604030504040204" pitchFamily="34" charset="0"/>
+              </a:rPr>
+              <a:t>Modeling Relative Abundance</a:t>
+            </a:r>
+          </a:p>
+        </p:txBody>
+      </p:sp>
+    </p:spTree>
+    <p:extLst>
+      <p:ext uri="{BB962C8B-B14F-4D97-AF65-F5344CB8AC3E}">
+        <p14:creationId xmlns:p14="http://schemas.microsoft.com/office/powerpoint/2010/main" val="645396"/>
+      </p:ext>
+    </p:extLst>
+  </p:cSld>
+  <p:clrMapOvr>
+    <a:masterClrMapping/>
+  </p:clrMapOvr>
+</p:sld>
+</file>
+
 <file path=ppt/slides/slide2.xml><?xml version="1.0" encoding="utf-8"?>
 <p:sld xmlns:a="http://schemas.openxmlformats.org/drawingml/2006/main" xmlns:r="http://schemas.openxmlformats.org/officeDocument/2006/relationships" xmlns:p="http://schemas.openxmlformats.org/presentationml/2006/main">
   <p:cSld>
@@ -6368,7 +6650,7 @@
             <a:r>
               <a:rPr lang="en-US" b="1" dirty="0">
                 <a:solidFill>
-                  <a:schemeClr val="accent2"/>
+                  <a:schemeClr val="accent6"/>
                 </a:solidFill>
               </a:rPr>
               <a:t>1 </a:t>
@@ -6376,7 +6658,7 @@
             <a:r>
               <a:rPr lang="en-US" dirty="0">
                 <a:solidFill>
-                  <a:schemeClr val="accent2"/>
+                  <a:schemeClr val="accent6"/>
                 </a:solidFill>
               </a:rPr>
               <a:t>parameter</a:t>
@@ -6583,14 +6865,14 @@
             <a:r>
               <a:rPr lang="en-US" b="1" dirty="0">
                 <a:solidFill>
-                  <a:schemeClr val="accent2"/>
+                  <a:schemeClr val="accent6"/>
                 </a:solidFill>
               </a:rPr>
               <a:t>2</a:t>
             </a:r>
             <a:endParaRPr lang="en-US" dirty="0">
               <a:solidFill>
-                <a:schemeClr val="accent2"/>
+                <a:schemeClr val="accent6"/>
               </a:solidFill>
             </a:endParaRPr>
           </a:p>
@@ -7027,14 +7309,14 @@
             <a:r>
               <a:rPr lang="en-US" b="1" dirty="0">
                 <a:solidFill>
-                  <a:schemeClr val="accent2"/>
+                  <a:schemeClr val="accent6"/>
                 </a:solidFill>
               </a:rPr>
               <a:t>3</a:t>
             </a:r>
             <a:endParaRPr lang="en-US" dirty="0">
               <a:solidFill>
-                <a:schemeClr val="accent2"/>
+                <a:schemeClr val="accent6"/>
               </a:solidFill>
             </a:endParaRPr>
           </a:p>
@@ -9312,829 +9594,354 @@
           <a:chExt cx="0" cy="0"/>
         </a:xfrm>
       </p:grpSpPr>
-      <p:sp>
-        <p:nvSpPr>
-          <p:cNvPr id="2" name="Title 1">
+      <p:cxnSp>
+        <p:nvCxnSpPr>
+          <p:cNvPr id="5" name="Straight Connector 4">
             <a:extLst>
               <a:ext uri="{FF2B5EF4-FFF2-40B4-BE49-F238E27FC236}">
-                <a16:creationId xmlns:a16="http://schemas.microsoft.com/office/drawing/2014/main" id="{2B75AEA5-388C-5042-8AB0-B2481E3D74E3}"/>
+                <a16:creationId xmlns:a16="http://schemas.microsoft.com/office/drawing/2014/main" id="{165DB295-1A40-AF4E-BF2C-EC8B9880EEE9}"/>
               </a:ext>
             </a:extLst>
           </p:cNvPr>
-          <p:cNvSpPr>
-            <a:spLocks noGrp="1"/>
-          </p:cNvSpPr>
-          <p:nvPr>
-            <p:ph type="title"/>
-          </p:nvPr>
-        </p:nvSpPr>
-        <p:spPr/>
-        <p:txBody>
-          <a:bodyPr/>
-          <a:lstStyle/>
-          <a:p>
-            <a:pPr algn="ctr"/>
-            <a:r>
-              <a:rPr lang="en-US" b="1" dirty="0">
-                <a:latin typeface="Helvetica" pitchFamily="2" charset="0"/>
-              </a:rPr>
-              <a:t>Objectives</a:t>
-            </a:r>
-          </a:p>
-        </p:txBody>
-      </p:sp>
-      <p:sp>
-        <p:nvSpPr>
-          <p:cNvPr id="3" name="Content Placeholder 2">
-            <a:extLst>
-              <a:ext uri="{FF2B5EF4-FFF2-40B4-BE49-F238E27FC236}">
-                <a16:creationId xmlns:a16="http://schemas.microsoft.com/office/drawing/2014/main" id="{F918C09C-6432-4F41-A0BC-E165B7FBCCAE}"/>
-              </a:ext>
-            </a:extLst>
-          </p:cNvPr>
-          <p:cNvSpPr>
-            <a:spLocks noGrp="1"/>
-          </p:cNvSpPr>
-          <p:nvPr>
-            <p:ph idx="1"/>
-          </p:nvPr>
-        </p:nvSpPr>
+          <p:cNvCxnSpPr/>
+          <p:nvPr/>
+        </p:nvCxnSpPr>
         <p:spPr>
           <a:xfrm>
-            <a:off x="6324978" y="1219766"/>
-            <a:ext cx="5614772" cy="5203124"/>
-          </a:xfrm>
-        </p:spPr>
-        <p:txBody>
-          <a:bodyPr>
-            <a:noAutofit/>
-          </a:bodyPr>
-          <a:lstStyle/>
-          <a:p>
-            <a:pPr marL="0" indent="0">
-              <a:lnSpc>
-                <a:spcPct val="100000"/>
-              </a:lnSpc>
-              <a:spcBef>
-                <a:spcPts val="0"/>
-              </a:spcBef>
-              <a:buNone/>
-            </a:pPr>
-            <a:r>
-              <a:rPr lang="en-US" sz="3200" b="1" dirty="0">
-                <a:solidFill>
-                  <a:srgbClr val="7030A0"/>
-                </a:solidFill>
-                <a:latin typeface="Helvetica" pitchFamily="2" charset="0"/>
-              </a:rPr>
-              <a:t>Prediction </a:t>
-            </a:r>
-          </a:p>
-          <a:p>
-            <a:pPr marL="0" indent="0">
-              <a:lnSpc>
-                <a:spcPct val="100000"/>
-              </a:lnSpc>
-              <a:spcBef>
-                <a:spcPts val="0"/>
-              </a:spcBef>
-              <a:buNone/>
-            </a:pPr>
-            <a:endParaRPr lang="en-US" sz="3200" b="1" dirty="0">
-              <a:solidFill>
-                <a:srgbClr val="7030A0"/>
-              </a:solidFill>
-              <a:latin typeface="Helvetica" pitchFamily="2" charset="0"/>
-            </a:endParaRPr>
-          </a:p>
-          <a:p>
-            <a:pPr marL="0" indent="0">
-              <a:lnSpc>
-                <a:spcPct val="100000"/>
-              </a:lnSpc>
-              <a:spcBef>
-                <a:spcPts val="0"/>
-              </a:spcBef>
-              <a:buNone/>
-            </a:pPr>
-            <a:r>
-              <a:rPr lang="en-US" sz="3200" b="1" dirty="0">
-                <a:solidFill>
-                  <a:srgbClr val="7030A0"/>
-                </a:solidFill>
-                <a:latin typeface="Helvetica" pitchFamily="2" charset="0"/>
-              </a:rPr>
-              <a:t>Describing patterns</a:t>
-            </a:r>
-          </a:p>
-          <a:p>
-            <a:pPr marL="0" indent="0">
-              <a:lnSpc>
-                <a:spcPct val="100000"/>
-              </a:lnSpc>
-              <a:spcBef>
-                <a:spcPts val="0"/>
-              </a:spcBef>
-              <a:buNone/>
-            </a:pPr>
-            <a:endParaRPr lang="en-US" sz="3200" b="1" dirty="0">
-              <a:solidFill>
-                <a:srgbClr val="7030A0"/>
-              </a:solidFill>
-              <a:latin typeface="Helvetica" pitchFamily="2" charset="0"/>
-            </a:endParaRPr>
-          </a:p>
-          <a:p>
-            <a:pPr marL="0" indent="0">
-              <a:lnSpc>
-                <a:spcPct val="100000"/>
-              </a:lnSpc>
-              <a:spcBef>
-                <a:spcPts val="0"/>
-              </a:spcBef>
-              <a:buNone/>
-            </a:pPr>
-            <a:r>
-              <a:rPr lang="en-US" sz="3200" dirty="0">
-                <a:solidFill>
-                  <a:srgbClr val="7030A0"/>
-                </a:solidFill>
-                <a:latin typeface="Helvetica" pitchFamily="2" charset="0"/>
-              </a:rPr>
-              <a:t>Where is highest abundance? </a:t>
-            </a:r>
-          </a:p>
-          <a:p>
-            <a:pPr marL="0" indent="0">
-              <a:lnSpc>
-                <a:spcPct val="100000"/>
-              </a:lnSpc>
-              <a:spcBef>
-                <a:spcPts val="0"/>
-              </a:spcBef>
-              <a:buNone/>
-            </a:pPr>
-            <a:endParaRPr lang="en-US" sz="3200" dirty="0">
-              <a:solidFill>
-                <a:srgbClr val="7030A0"/>
-              </a:solidFill>
-              <a:latin typeface="Helvetica" pitchFamily="2" charset="0"/>
-            </a:endParaRPr>
-          </a:p>
-          <a:p>
-            <a:pPr>
-              <a:lnSpc>
-                <a:spcPct val="100000"/>
-              </a:lnSpc>
-              <a:spcBef>
-                <a:spcPts val="0"/>
-              </a:spcBef>
-            </a:pPr>
-            <a:r>
-              <a:rPr lang="en-US" sz="3200" dirty="0">
-                <a:solidFill>
-                  <a:srgbClr val="7030A0"/>
-                </a:solidFill>
-                <a:latin typeface="Helvetica" pitchFamily="2" charset="0"/>
-              </a:rPr>
-              <a:t>Data Driven</a:t>
-            </a:r>
-          </a:p>
-          <a:p>
-            <a:pPr>
-              <a:lnSpc>
-                <a:spcPct val="100000"/>
-              </a:lnSpc>
-              <a:spcBef>
-                <a:spcPts val="0"/>
-              </a:spcBef>
-            </a:pPr>
-            <a:r>
-              <a:rPr lang="en-US" sz="3200" dirty="0">
-                <a:solidFill>
-                  <a:srgbClr val="7030A0"/>
-                </a:solidFill>
-                <a:latin typeface="Helvetica" pitchFamily="2" charset="0"/>
-              </a:rPr>
-              <a:t>Prediction Focused</a:t>
-            </a:r>
-          </a:p>
-          <a:p>
-            <a:pPr>
-              <a:lnSpc>
-                <a:spcPct val="100000"/>
-              </a:lnSpc>
-              <a:spcBef>
-                <a:spcPts val="0"/>
-              </a:spcBef>
-            </a:pPr>
-            <a:r>
-              <a:rPr lang="en-US" sz="3200" dirty="0">
-                <a:solidFill>
-                  <a:srgbClr val="7030A0"/>
-                </a:solidFill>
-                <a:latin typeface="Helvetica" pitchFamily="2" charset="0"/>
-              </a:rPr>
-              <a:t>Generalization</a:t>
-            </a:r>
-          </a:p>
-          <a:p>
-            <a:pPr>
-              <a:lnSpc>
-                <a:spcPct val="100000"/>
-              </a:lnSpc>
-              <a:spcBef>
-                <a:spcPts val="0"/>
-              </a:spcBef>
-            </a:pPr>
-            <a:r>
-              <a:rPr lang="en-US" sz="3200" b="1" dirty="0">
-                <a:solidFill>
-                  <a:srgbClr val="7030A0"/>
-                </a:solidFill>
-                <a:latin typeface="Helvetica" pitchFamily="2" charset="0"/>
-              </a:rPr>
-              <a:t>Random forests</a:t>
-            </a:r>
-          </a:p>
-          <a:p>
-            <a:pPr marL="0" indent="0">
-              <a:spcBef>
-                <a:spcPts val="0"/>
-              </a:spcBef>
-              <a:buNone/>
-            </a:pPr>
-            <a:endParaRPr lang="en-US" sz="3200" dirty="0">
-              <a:solidFill>
-                <a:srgbClr val="7030A0"/>
-              </a:solidFill>
-              <a:latin typeface="Helvetica" pitchFamily="2" charset="0"/>
-            </a:endParaRPr>
-          </a:p>
-        </p:txBody>
-      </p:sp>
-      <p:sp>
-        <p:nvSpPr>
-          <p:cNvPr id="12" name="Line 8">
-            <a:extLst>
-              <a:ext uri="{FF2B5EF4-FFF2-40B4-BE49-F238E27FC236}">
-                <a16:creationId xmlns:a16="http://schemas.microsoft.com/office/drawing/2014/main" id="{CE94BC92-3E82-4542-A4F4-1EB5867C1AF0}"/>
-              </a:ext>
-            </a:extLst>
-          </p:cNvPr>
-          <p:cNvSpPr>
-            <a:spLocks noChangeShapeType="1"/>
-          </p:cNvSpPr>
-          <p:nvPr/>
-        </p:nvSpPr>
-        <p:spPr bwMode="auto">
-          <a:xfrm>
-            <a:off x="2735046" y="950260"/>
-            <a:ext cx="6553197" cy="0"/>
+            <a:off x="1824037" y="2200275"/>
+            <a:ext cx="8543925" cy="0"/>
           </a:xfrm>
           <a:prstGeom prst="line">
             <a:avLst/>
           </a:prstGeom>
-          <a:noFill/>
-          <a:ln w="57150">
-            <a:solidFill>
-              <a:schemeClr val="tx1"/>
-            </a:solidFill>
-            <a:round/>
-            <a:headEnd type="stealth" w="med" len="med"/>
-            <a:tailEnd type="stealth" w="med" len="med"/>
-          </a:ln>
-        </p:spPr>
-        <p:txBody>
-          <a:bodyPr>
-            <a:prstTxWarp prst="textNoShape">
-              <a:avLst/>
-            </a:prstTxWarp>
-          </a:bodyPr>
-          <a:lstStyle/>
-          <a:p>
-            <a:endParaRPr lang="en-US">
-              <a:latin typeface="Helvetica" pitchFamily="2" charset="0"/>
-            </a:endParaRPr>
-          </a:p>
-        </p:txBody>
-      </p:sp>
-      <p:sp>
-        <p:nvSpPr>
-          <p:cNvPr id="13" name="Content Placeholder 2">
-            <a:extLst>
-              <a:ext uri="{FF2B5EF4-FFF2-40B4-BE49-F238E27FC236}">
-                <a16:creationId xmlns:a16="http://schemas.microsoft.com/office/drawing/2014/main" id="{A836882A-6F66-B947-A491-FBC0CCA5000F}"/>
-              </a:ext>
-            </a:extLst>
-          </p:cNvPr>
-          <p:cNvSpPr txBox="1">
-            <a:spLocks/>
-          </p:cNvSpPr>
-          <p:nvPr/>
-        </p:nvSpPr>
-        <p:spPr>
-          <a:xfrm>
-            <a:off x="386682" y="1219483"/>
-            <a:ext cx="5339031" cy="4889009"/>
-          </a:xfrm>
-          <a:prstGeom prst="rect">
-            <a:avLst/>
-          </a:prstGeom>
-        </p:spPr>
-        <p:txBody>
-          <a:bodyPr vert="horz" lIns="91440" tIns="45720" rIns="91440" bIns="45720" rtlCol="0">
-            <a:noAutofit/>
-          </a:bodyPr>
-          <a:lstStyle>
-            <a:lvl1pPr marL="228600" indent="-228600" algn="l" defTabSz="914400" rtl="0" eaLnBrk="1" latinLnBrk="0" hangingPunct="1">
-              <a:lnSpc>
-                <a:spcPct val="90000"/>
-              </a:lnSpc>
-              <a:spcBef>
-                <a:spcPts val="1000"/>
-              </a:spcBef>
-              <a:buFont typeface="Arial" panose="020B0604020202020204" pitchFamily="34" charset="0"/>
-              <a:buChar char="•"/>
-              <a:defRPr sz="2800" kern="1200">
-                <a:solidFill>
-                  <a:schemeClr val="tx1"/>
-                </a:solidFill>
-                <a:latin typeface="+mn-lt"/>
-                <a:ea typeface="+mn-ea"/>
-                <a:cs typeface="+mn-cs"/>
-              </a:defRPr>
-            </a:lvl1pPr>
-            <a:lvl2pPr marL="685800" indent="-228600" algn="l" defTabSz="914400" rtl="0" eaLnBrk="1" latinLnBrk="0" hangingPunct="1">
-              <a:lnSpc>
-                <a:spcPct val="90000"/>
-              </a:lnSpc>
-              <a:spcBef>
-                <a:spcPts val="500"/>
-              </a:spcBef>
-              <a:buFont typeface="Arial" panose="020B0604020202020204" pitchFamily="34" charset="0"/>
-              <a:buChar char="•"/>
-              <a:defRPr sz="2400" kern="1200">
-                <a:solidFill>
-                  <a:schemeClr val="tx1"/>
-                </a:solidFill>
-                <a:latin typeface="+mn-lt"/>
-                <a:ea typeface="+mn-ea"/>
-                <a:cs typeface="+mn-cs"/>
-              </a:defRPr>
-            </a:lvl2pPr>
-            <a:lvl3pPr marL="1143000" indent="-228600" algn="l" defTabSz="914400" rtl="0" eaLnBrk="1" latinLnBrk="0" hangingPunct="1">
-              <a:lnSpc>
-                <a:spcPct val="90000"/>
-              </a:lnSpc>
-              <a:spcBef>
-                <a:spcPts val="500"/>
-              </a:spcBef>
-              <a:buFont typeface="Arial" panose="020B0604020202020204" pitchFamily="34" charset="0"/>
-              <a:buChar char="•"/>
-              <a:defRPr sz="2000" kern="1200">
-                <a:solidFill>
-                  <a:schemeClr val="tx1"/>
-                </a:solidFill>
-                <a:latin typeface="+mn-lt"/>
-                <a:ea typeface="+mn-ea"/>
-                <a:cs typeface="+mn-cs"/>
-              </a:defRPr>
-            </a:lvl3pPr>
-            <a:lvl4pPr marL="1600200" indent="-228600" algn="l" defTabSz="914400" rtl="0" eaLnBrk="1" latinLnBrk="0" hangingPunct="1">
-              <a:lnSpc>
-                <a:spcPct val="90000"/>
-              </a:lnSpc>
-              <a:spcBef>
-                <a:spcPts val="500"/>
-              </a:spcBef>
-              <a:buFont typeface="Arial" panose="020B0604020202020204" pitchFamily="34" charset="0"/>
-              <a:buChar char="•"/>
-              <a:defRPr sz="1800" kern="1200">
-                <a:solidFill>
-                  <a:schemeClr val="tx1"/>
-                </a:solidFill>
-                <a:latin typeface="+mn-lt"/>
-                <a:ea typeface="+mn-ea"/>
-                <a:cs typeface="+mn-cs"/>
-              </a:defRPr>
-            </a:lvl4pPr>
-            <a:lvl5pPr marL="2057400" indent="-228600" algn="l" defTabSz="914400" rtl="0" eaLnBrk="1" latinLnBrk="0" hangingPunct="1">
-              <a:lnSpc>
-                <a:spcPct val="90000"/>
-              </a:lnSpc>
-              <a:spcBef>
-                <a:spcPts val="500"/>
-              </a:spcBef>
-              <a:buFont typeface="Arial" panose="020B0604020202020204" pitchFamily="34" charset="0"/>
-              <a:buChar char="•"/>
-              <a:defRPr sz="1800" kern="1200">
-                <a:solidFill>
-                  <a:schemeClr val="tx1"/>
-                </a:solidFill>
-                <a:latin typeface="+mn-lt"/>
-                <a:ea typeface="+mn-ea"/>
-                <a:cs typeface="+mn-cs"/>
-              </a:defRPr>
-            </a:lvl5pPr>
-            <a:lvl6pPr marL="2514600" indent="-228600" algn="l" defTabSz="914400" rtl="0" eaLnBrk="1" latinLnBrk="0" hangingPunct="1">
-              <a:lnSpc>
-                <a:spcPct val="90000"/>
-              </a:lnSpc>
-              <a:spcBef>
-                <a:spcPts val="500"/>
-              </a:spcBef>
-              <a:buFont typeface="Arial" panose="020B0604020202020204" pitchFamily="34" charset="0"/>
-              <a:buChar char="•"/>
-              <a:defRPr sz="1800" kern="1200">
-                <a:solidFill>
-                  <a:schemeClr val="tx1"/>
-                </a:solidFill>
-                <a:latin typeface="+mn-lt"/>
-                <a:ea typeface="+mn-ea"/>
-                <a:cs typeface="+mn-cs"/>
-              </a:defRPr>
-            </a:lvl6pPr>
-            <a:lvl7pPr marL="2971800" indent="-228600" algn="l" defTabSz="914400" rtl="0" eaLnBrk="1" latinLnBrk="0" hangingPunct="1">
-              <a:lnSpc>
-                <a:spcPct val="90000"/>
-              </a:lnSpc>
-              <a:spcBef>
-                <a:spcPts val="500"/>
-              </a:spcBef>
-              <a:buFont typeface="Arial" panose="020B0604020202020204" pitchFamily="34" charset="0"/>
-              <a:buChar char="•"/>
-              <a:defRPr sz="1800" kern="1200">
-                <a:solidFill>
-                  <a:schemeClr val="tx1"/>
-                </a:solidFill>
-                <a:latin typeface="+mn-lt"/>
-                <a:ea typeface="+mn-ea"/>
-                <a:cs typeface="+mn-cs"/>
-              </a:defRPr>
-            </a:lvl7pPr>
-            <a:lvl8pPr marL="3429000" indent="-228600" algn="l" defTabSz="914400" rtl="0" eaLnBrk="1" latinLnBrk="0" hangingPunct="1">
-              <a:lnSpc>
-                <a:spcPct val="90000"/>
-              </a:lnSpc>
-              <a:spcBef>
-                <a:spcPts val="500"/>
-              </a:spcBef>
-              <a:buFont typeface="Arial" panose="020B0604020202020204" pitchFamily="34" charset="0"/>
-              <a:buChar char="•"/>
-              <a:defRPr sz="1800" kern="1200">
-                <a:solidFill>
-                  <a:schemeClr val="tx1"/>
-                </a:solidFill>
-                <a:latin typeface="+mn-lt"/>
-                <a:ea typeface="+mn-ea"/>
-                <a:cs typeface="+mn-cs"/>
-              </a:defRPr>
-            </a:lvl8pPr>
-            <a:lvl9pPr marL="3886200" indent="-228600" algn="l" defTabSz="914400" rtl="0" eaLnBrk="1" latinLnBrk="0" hangingPunct="1">
-              <a:lnSpc>
-                <a:spcPct val="90000"/>
-              </a:lnSpc>
-              <a:spcBef>
-                <a:spcPts val="500"/>
-              </a:spcBef>
-              <a:buFont typeface="Arial" panose="020B0604020202020204" pitchFamily="34" charset="0"/>
-              <a:buChar char="•"/>
-              <a:defRPr sz="1800" kern="1200">
-                <a:solidFill>
-                  <a:schemeClr val="tx1"/>
-                </a:solidFill>
-                <a:latin typeface="+mn-lt"/>
-                <a:ea typeface="+mn-ea"/>
-                <a:cs typeface="+mn-cs"/>
-              </a:defRPr>
-            </a:lvl9pPr>
-          </a:lstStyle>
-          <a:p>
-            <a:pPr marL="0" indent="0">
-              <a:lnSpc>
-                <a:spcPct val="100000"/>
-              </a:lnSpc>
-              <a:spcBef>
-                <a:spcPts val="0"/>
-              </a:spcBef>
-              <a:buFont typeface="Arial" panose="020B0604020202020204" pitchFamily="34" charset="0"/>
-              <a:buNone/>
-            </a:pPr>
-            <a:r>
-              <a:rPr lang="en-US" sz="3200" b="1" dirty="0">
-                <a:solidFill>
-                  <a:schemeClr val="accent6">
-                    <a:lumMod val="75000"/>
-                  </a:schemeClr>
-                </a:solidFill>
-                <a:latin typeface="Helvetica" pitchFamily="2" charset="0"/>
-              </a:rPr>
-              <a:t>Inference</a:t>
-            </a:r>
-          </a:p>
-          <a:p>
-            <a:pPr marL="0" indent="0">
-              <a:lnSpc>
-                <a:spcPct val="100000"/>
-              </a:lnSpc>
-              <a:spcBef>
-                <a:spcPts val="0"/>
-              </a:spcBef>
-              <a:buFont typeface="Arial" panose="020B0604020202020204" pitchFamily="34" charset="0"/>
-              <a:buNone/>
-            </a:pPr>
-            <a:endParaRPr lang="en-US" sz="3200" b="1" dirty="0">
-              <a:solidFill>
-                <a:schemeClr val="accent6">
-                  <a:lumMod val="75000"/>
-                </a:schemeClr>
-              </a:solidFill>
-              <a:latin typeface="Helvetica" pitchFamily="2" charset="0"/>
-            </a:endParaRPr>
-          </a:p>
-          <a:p>
-            <a:pPr marL="0" indent="0">
-              <a:lnSpc>
-                <a:spcPct val="100000"/>
-              </a:lnSpc>
-              <a:spcBef>
-                <a:spcPts val="0"/>
-              </a:spcBef>
-              <a:buFont typeface="Arial" panose="020B0604020202020204" pitchFamily="34" charset="0"/>
-              <a:buNone/>
-            </a:pPr>
-            <a:r>
-              <a:rPr lang="en-US" sz="3200" b="1" dirty="0">
-                <a:solidFill>
-                  <a:schemeClr val="accent6">
-                    <a:lumMod val="75000"/>
-                  </a:schemeClr>
-                </a:solidFill>
-                <a:latin typeface="Helvetica" pitchFamily="2" charset="0"/>
-              </a:rPr>
-              <a:t>Explaining process</a:t>
-            </a:r>
-          </a:p>
-          <a:p>
-            <a:pPr marL="0" indent="0">
-              <a:lnSpc>
-                <a:spcPct val="100000"/>
-              </a:lnSpc>
-              <a:spcBef>
-                <a:spcPts val="0"/>
-              </a:spcBef>
-              <a:buFont typeface="Arial" panose="020B0604020202020204" pitchFamily="34" charset="0"/>
-              <a:buNone/>
-            </a:pPr>
-            <a:endParaRPr lang="en-US" sz="3200" b="1" dirty="0">
-              <a:solidFill>
-                <a:schemeClr val="accent6">
-                  <a:lumMod val="75000"/>
-                </a:schemeClr>
-              </a:solidFill>
-              <a:latin typeface="Helvetica" pitchFamily="2" charset="0"/>
-            </a:endParaRPr>
-          </a:p>
-          <a:p>
-            <a:pPr marL="0" indent="0">
-              <a:lnSpc>
-                <a:spcPct val="100000"/>
-              </a:lnSpc>
-              <a:spcBef>
-                <a:spcPts val="0"/>
-              </a:spcBef>
-              <a:buFont typeface="Arial" panose="020B0604020202020204" pitchFamily="34" charset="0"/>
-              <a:buNone/>
-            </a:pPr>
-            <a:r>
-              <a:rPr lang="en-US" sz="3200" dirty="0">
-                <a:solidFill>
-                  <a:schemeClr val="accent6">
-                    <a:lumMod val="75000"/>
-                  </a:schemeClr>
-                </a:solidFill>
-                <a:latin typeface="Helvetica" pitchFamily="2" charset="0"/>
-              </a:rPr>
-              <a:t>Is forest important habitat?</a:t>
-            </a:r>
-          </a:p>
-          <a:p>
-            <a:pPr marL="0" indent="0">
-              <a:lnSpc>
-                <a:spcPct val="100000"/>
-              </a:lnSpc>
-              <a:spcBef>
-                <a:spcPts val="0"/>
-              </a:spcBef>
-              <a:buFont typeface="Arial" panose="020B0604020202020204" pitchFamily="34" charset="0"/>
-              <a:buNone/>
-            </a:pPr>
-            <a:endParaRPr lang="en-US" sz="3200" dirty="0">
-              <a:solidFill>
-                <a:schemeClr val="accent6">
-                  <a:lumMod val="75000"/>
-                </a:schemeClr>
-              </a:solidFill>
-              <a:latin typeface="Helvetica" pitchFamily="2" charset="0"/>
-            </a:endParaRPr>
-          </a:p>
-          <a:p>
-            <a:pPr>
-              <a:lnSpc>
-                <a:spcPct val="100000"/>
-              </a:lnSpc>
-              <a:spcBef>
-                <a:spcPts val="0"/>
-              </a:spcBef>
-            </a:pPr>
-            <a:r>
-              <a:rPr lang="en-US" sz="3200" dirty="0">
-                <a:solidFill>
-                  <a:schemeClr val="accent6">
-                    <a:lumMod val="75000"/>
-                  </a:schemeClr>
-                </a:solidFill>
-                <a:latin typeface="Helvetica" pitchFamily="2" charset="0"/>
-              </a:rPr>
-              <a:t>User designed</a:t>
-            </a:r>
-          </a:p>
-          <a:p>
-            <a:pPr>
-              <a:lnSpc>
-                <a:spcPct val="100000"/>
-              </a:lnSpc>
-              <a:spcBef>
-                <a:spcPts val="0"/>
-              </a:spcBef>
-            </a:pPr>
-            <a:r>
-              <a:rPr lang="en-US" sz="3200" dirty="0">
-                <a:solidFill>
-                  <a:schemeClr val="accent6">
-                    <a:lumMod val="75000"/>
-                  </a:schemeClr>
-                </a:solidFill>
-                <a:latin typeface="Helvetica" pitchFamily="2" charset="0"/>
-              </a:rPr>
-              <a:t>Parameter estimation</a:t>
-            </a:r>
-          </a:p>
-          <a:p>
-            <a:pPr>
-              <a:lnSpc>
-                <a:spcPct val="100000"/>
-              </a:lnSpc>
-              <a:spcBef>
-                <a:spcPts val="0"/>
-              </a:spcBef>
-            </a:pPr>
-            <a:r>
-              <a:rPr lang="en-US" sz="3200" dirty="0">
-                <a:solidFill>
-                  <a:schemeClr val="accent6">
-                    <a:lumMod val="75000"/>
-                  </a:schemeClr>
-                </a:solidFill>
-                <a:latin typeface="Helvetica" pitchFamily="2" charset="0"/>
-              </a:rPr>
-              <a:t>Account for Uncertainty</a:t>
-            </a:r>
-          </a:p>
-          <a:p>
-            <a:pPr>
-              <a:lnSpc>
-                <a:spcPct val="100000"/>
-              </a:lnSpc>
-              <a:spcBef>
-                <a:spcPts val="0"/>
-              </a:spcBef>
-            </a:pPr>
-            <a:r>
-              <a:rPr lang="en-US" sz="3200" b="1" dirty="0">
-                <a:solidFill>
-                  <a:schemeClr val="accent6">
-                    <a:lumMod val="75000"/>
-                  </a:schemeClr>
-                </a:solidFill>
-                <a:latin typeface="Helvetica" pitchFamily="2" charset="0"/>
-              </a:rPr>
-              <a:t>GAMs</a:t>
-            </a:r>
-          </a:p>
-        </p:txBody>
-      </p:sp>
-      <p:sp>
-        <p:nvSpPr>
-          <p:cNvPr id="4" name="Rectangle 3">
-            <a:extLst>
-              <a:ext uri="{FF2B5EF4-FFF2-40B4-BE49-F238E27FC236}">
-                <a16:creationId xmlns:a16="http://schemas.microsoft.com/office/drawing/2014/main" id="{947B3428-FBA3-314F-A14C-7A36C32DB078}"/>
-              </a:ext>
-            </a:extLst>
-          </p:cNvPr>
-          <p:cNvSpPr/>
-          <p:nvPr/>
-        </p:nvSpPr>
-        <p:spPr>
-          <a:xfrm>
-            <a:off x="228599" y="3073400"/>
-            <a:ext cx="5783045" cy="3556108"/>
-          </a:xfrm>
-          <a:prstGeom prst="rect">
-            <a:avLst/>
-          </a:prstGeom>
-          <a:solidFill>
-            <a:schemeClr val="bg1"/>
-          </a:solidFill>
-          <a:ln>
-            <a:noFill/>
-          </a:ln>
+          <a:ln w="28575"/>
         </p:spPr>
         <p:style>
-          <a:lnRef idx="2">
-            <a:schemeClr val="accent1">
-              <a:shade val="50000"/>
-            </a:schemeClr>
+          <a:lnRef idx="1">
+            <a:schemeClr val="accent1"/>
           </a:lnRef>
-          <a:fillRef idx="1">
+          <a:fillRef idx="0">
             <a:schemeClr val="accent1"/>
           </a:fillRef>
           <a:effectRef idx="0">
             <a:schemeClr val="accent1"/>
           </a:effectRef>
           <a:fontRef idx="minor">
-            <a:schemeClr val="lt1"/>
+            <a:schemeClr val="tx1"/>
           </a:fontRef>
         </p:style>
-        <p:txBody>
-          <a:bodyPr rtlCol="0" anchor="ctr"/>
-          <a:lstStyle/>
-          <a:p>
-            <a:pPr algn="ctr"/>
-            <a:endParaRPr lang="en-US"/>
-          </a:p>
-        </p:txBody>
-      </p:sp>
-      <p:sp>
-        <p:nvSpPr>
-          <p:cNvPr id="9" name="Rectangle 8">
+      </p:cxnSp>
+      <p:sp>
+        <p:nvSpPr>
+          <p:cNvPr id="6" name="TextBox 5">
             <a:extLst>
               <a:ext uri="{FF2B5EF4-FFF2-40B4-BE49-F238E27FC236}">
-                <a16:creationId xmlns:a16="http://schemas.microsoft.com/office/drawing/2014/main" id="{8CFFB391-2302-D14C-8138-EC4042F92171}"/>
+                <a16:creationId xmlns:a16="http://schemas.microsoft.com/office/drawing/2014/main" id="{B461D435-A9EE-E54B-B99F-5F149D5B98F0}"/>
               </a:ext>
             </a:extLst>
           </p:cNvPr>
-          <p:cNvSpPr/>
+          <p:cNvSpPr txBox="1"/>
           <p:nvPr/>
         </p:nvSpPr>
         <p:spPr>
           <a:xfrm>
-            <a:off x="6240841" y="3073400"/>
-            <a:ext cx="5783045" cy="3556108"/>
+            <a:off x="128586" y="985837"/>
+            <a:ext cx="4086225" cy="1661993"/>
           </a:xfrm>
           <a:prstGeom prst="rect">
             <a:avLst/>
           </a:prstGeom>
-          <a:solidFill>
-            <a:schemeClr val="bg1"/>
-          </a:solidFill>
-          <a:ln>
-            <a:noFill/>
-          </a:ln>
+          <a:noFill/>
         </p:spPr>
-        <p:style>
-          <a:lnRef idx="2">
-            <a:schemeClr val="accent1">
-              <a:shade val="50000"/>
-            </a:schemeClr>
-          </a:lnRef>
-          <a:fillRef idx="1">
-            <a:schemeClr val="accent1"/>
-          </a:fillRef>
-          <a:effectRef idx="0">
-            <a:schemeClr val="accent1"/>
-          </a:effectRef>
-          <a:fontRef idx="minor">
-            <a:schemeClr val="lt1"/>
-          </a:fontRef>
-        </p:style>
         <p:txBody>
-          <a:bodyPr rtlCol="0" anchor="ctr"/>
+          <a:bodyPr wrap="square" rtlCol="0">
+            <a:spAutoFit/>
+          </a:bodyPr>
           <a:lstStyle/>
           <a:p>
             <a:pPr algn="ctr"/>
-            <a:endParaRPr lang="en-US"/>
+            <a:r>
+              <a:rPr lang="en-US" sz="2800" dirty="0">
+                <a:solidFill>
+                  <a:schemeClr val="accent1"/>
+                </a:solidFill>
+              </a:rPr>
+              <a:t>Simpler model structure</a:t>
+            </a:r>
+          </a:p>
+          <a:p>
+            <a:pPr algn="ctr"/>
+            <a:r>
+              <a:rPr lang="en-US" sz="2800" dirty="0">
+                <a:solidFill>
+                  <a:schemeClr val="accent1"/>
+                </a:solidFill>
+              </a:rPr>
+              <a:t>Parametric relationships</a:t>
+            </a:r>
+          </a:p>
+          <a:p>
+            <a:pPr algn="ctr"/>
+            <a:endParaRPr lang="en-US" sz="2800" dirty="0">
+              <a:solidFill>
+                <a:schemeClr val="accent1"/>
+              </a:solidFill>
+            </a:endParaRPr>
+          </a:p>
+          <a:p>
+            <a:pPr algn="ctr"/>
+            <a:endParaRPr lang="en-US" dirty="0"/>
+          </a:p>
+        </p:txBody>
+      </p:sp>
+      <p:sp>
+        <p:nvSpPr>
+          <p:cNvPr id="7" name="TextBox 6">
+            <a:extLst>
+              <a:ext uri="{FF2B5EF4-FFF2-40B4-BE49-F238E27FC236}">
+                <a16:creationId xmlns:a16="http://schemas.microsoft.com/office/drawing/2014/main" id="{8A3D4F52-917D-3F4F-89A5-C6560B047DE1}"/>
+              </a:ext>
+            </a:extLst>
+          </p:cNvPr>
+          <p:cNvSpPr txBox="1"/>
+          <p:nvPr/>
+        </p:nvSpPr>
+        <p:spPr>
+          <a:xfrm>
+            <a:off x="8105775" y="985838"/>
+            <a:ext cx="4086225" cy="1661993"/>
+          </a:xfrm>
+          <a:prstGeom prst="rect">
+            <a:avLst/>
+          </a:prstGeom>
+          <a:noFill/>
+        </p:spPr>
+        <p:txBody>
+          <a:bodyPr wrap="square" rtlCol="0">
+            <a:spAutoFit/>
+          </a:bodyPr>
+          <a:lstStyle/>
+          <a:p>
+            <a:pPr algn="ctr"/>
+            <a:r>
+              <a:rPr lang="en-US" sz="2800" dirty="0">
+                <a:solidFill>
+                  <a:schemeClr val="accent1"/>
+                </a:solidFill>
+              </a:rPr>
+              <a:t>Complex model structure</a:t>
+            </a:r>
+          </a:p>
+          <a:p>
+            <a:pPr algn="ctr"/>
+            <a:r>
+              <a:rPr lang="en-US" sz="2800" dirty="0">
+                <a:solidFill>
+                  <a:schemeClr val="accent1"/>
+                </a:solidFill>
+              </a:rPr>
+              <a:t>Black box</a:t>
+            </a:r>
+          </a:p>
+          <a:p>
+            <a:pPr algn="ctr"/>
+            <a:endParaRPr lang="en-US" sz="2800" dirty="0">
+              <a:solidFill>
+                <a:schemeClr val="accent1"/>
+              </a:solidFill>
+            </a:endParaRPr>
+          </a:p>
+          <a:p>
+            <a:pPr algn="ctr"/>
+            <a:endParaRPr lang="en-US" dirty="0"/>
+          </a:p>
+        </p:txBody>
+      </p:sp>
+      <p:sp>
+        <p:nvSpPr>
+          <p:cNvPr id="10" name="TextBox 9">
+            <a:extLst>
+              <a:ext uri="{FF2B5EF4-FFF2-40B4-BE49-F238E27FC236}">
+                <a16:creationId xmlns:a16="http://schemas.microsoft.com/office/drawing/2014/main" id="{EFC36FC6-8CCB-7B4A-B819-8176669EAF2E}"/>
+              </a:ext>
+            </a:extLst>
+          </p:cNvPr>
+          <p:cNvSpPr txBox="1"/>
+          <p:nvPr/>
+        </p:nvSpPr>
+        <p:spPr>
+          <a:xfrm>
+            <a:off x="128586" y="2548177"/>
+            <a:ext cx="4086225" cy="1661993"/>
+          </a:xfrm>
+          <a:prstGeom prst="rect">
+            <a:avLst/>
+          </a:prstGeom>
+          <a:noFill/>
+        </p:spPr>
+        <p:txBody>
+          <a:bodyPr wrap="square" rtlCol="0">
+            <a:spAutoFit/>
+          </a:bodyPr>
+          <a:lstStyle/>
+          <a:p>
+            <a:r>
+              <a:rPr lang="en-US" sz="2800" b="1" dirty="0">
+                <a:solidFill>
+                  <a:srgbClr val="7030A0"/>
+                </a:solidFill>
+              </a:rPr>
+              <a:t>Inference</a:t>
+            </a:r>
+          </a:p>
+          <a:p>
+            <a:r>
+              <a:rPr lang="en-US" sz="2800" b="1" dirty="0">
+                <a:solidFill>
+                  <a:srgbClr val="7030A0"/>
+                </a:solidFill>
+              </a:rPr>
+              <a:t>Explanation</a:t>
+            </a:r>
+          </a:p>
+          <a:p>
+            <a:r>
+              <a:rPr lang="en-US" sz="2800" b="1" dirty="0">
+                <a:solidFill>
+                  <a:srgbClr val="7030A0"/>
+                </a:solidFill>
+              </a:rPr>
+              <a:t>Process</a:t>
+            </a:r>
+          </a:p>
+          <a:p>
+            <a:endParaRPr lang="en-US" dirty="0">
+              <a:solidFill>
+                <a:srgbClr val="7030A0"/>
+              </a:solidFill>
+            </a:endParaRPr>
+          </a:p>
+        </p:txBody>
+      </p:sp>
+      <p:sp>
+        <p:nvSpPr>
+          <p:cNvPr id="12" name="TextBox 11">
+            <a:extLst>
+              <a:ext uri="{FF2B5EF4-FFF2-40B4-BE49-F238E27FC236}">
+                <a16:creationId xmlns:a16="http://schemas.microsoft.com/office/drawing/2014/main" id="{525BA95A-1357-C641-9610-9342CDF968B2}"/>
+              </a:ext>
+            </a:extLst>
+          </p:cNvPr>
+          <p:cNvSpPr txBox="1"/>
+          <p:nvPr/>
+        </p:nvSpPr>
+        <p:spPr>
+          <a:xfrm>
+            <a:off x="4040979" y="3064078"/>
+            <a:ext cx="4086225" cy="461665"/>
+          </a:xfrm>
+          <a:prstGeom prst="rect">
+            <a:avLst/>
+          </a:prstGeom>
+          <a:noFill/>
+        </p:spPr>
+        <p:txBody>
+          <a:bodyPr wrap="square" rtlCol="0">
+            <a:spAutoFit/>
+          </a:bodyPr>
+          <a:lstStyle/>
+          <a:p>
+            <a:pPr algn="ctr"/>
+            <a:r>
+              <a:rPr lang="en-US" sz="2400" dirty="0">
+                <a:solidFill>
+                  <a:schemeClr val="tx1">
+                    <a:lumMod val="75000"/>
+                    <a:lumOff val="25000"/>
+                  </a:schemeClr>
+                </a:solidFill>
+              </a:rPr>
+              <a:t>BEST FOR</a:t>
+            </a:r>
+          </a:p>
+        </p:txBody>
+      </p:sp>
+      <p:sp>
+        <p:nvSpPr>
+          <p:cNvPr id="13" name="TextBox 12">
+            <a:extLst>
+              <a:ext uri="{FF2B5EF4-FFF2-40B4-BE49-F238E27FC236}">
+                <a16:creationId xmlns:a16="http://schemas.microsoft.com/office/drawing/2014/main" id="{7DC0677D-E22F-664D-B445-28926FC056F0}"/>
+              </a:ext>
+            </a:extLst>
+          </p:cNvPr>
+          <p:cNvSpPr txBox="1"/>
+          <p:nvPr/>
+        </p:nvSpPr>
+        <p:spPr>
+          <a:xfrm>
+            <a:off x="7953372" y="2548177"/>
+            <a:ext cx="4086225" cy="1661993"/>
+          </a:xfrm>
+          <a:prstGeom prst="rect">
+            <a:avLst/>
+          </a:prstGeom>
+          <a:noFill/>
+        </p:spPr>
+        <p:txBody>
+          <a:bodyPr wrap="square" rtlCol="0">
+            <a:spAutoFit/>
+          </a:bodyPr>
+          <a:lstStyle/>
+          <a:p>
+            <a:pPr algn="r"/>
+            <a:r>
+              <a:rPr lang="en-US" sz="2800" b="1" dirty="0">
+                <a:solidFill>
+                  <a:schemeClr val="accent6"/>
+                </a:solidFill>
+              </a:rPr>
+              <a:t>Prediction</a:t>
+            </a:r>
+          </a:p>
+          <a:p>
+            <a:pPr algn="r"/>
+            <a:r>
+              <a:rPr lang="en-US" sz="2800" b="1" dirty="0">
+                <a:solidFill>
+                  <a:schemeClr val="accent6"/>
+                </a:solidFill>
+              </a:rPr>
+              <a:t>Description</a:t>
+            </a:r>
+          </a:p>
+          <a:p>
+            <a:pPr algn="r"/>
+            <a:r>
+              <a:rPr lang="en-US" sz="2800" b="1" dirty="0">
+                <a:solidFill>
+                  <a:schemeClr val="accent6"/>
+                </a:solidFill>
+              </a:rPr>
+              <a:t>Pattern</a:t>
+            </a:r>
+          </a:p>
+          <a:p>
+            <a:pPr algn="r"/>
+            <a:endParaRPr lang="en-US" b="1" dirty="0">
+              <a:solidFill>
+                <a:schemeClr val="accent6"/>
+              </a:solidFill>
+            </a:endParaRPr>
           </a:p>
         </p:txBody>
       </p:sp>
       <p:grpSp>
         <p:nvGrpSpPr>
-          <p:cNvPr id="8" name="Group 7">
+          <p:cNvPr id="14" name="Group 13">
             <a:extLst>
               <a:ext uri="{FF2B5EF4-FFF2-40B4-BE49-F238E27FC236}">
-                <a16:creationId xmlns:a16="http://schemas.microsoft.com/office/drawing/2014/main" id="{89CC6006-D0DD-FF44-AA92-B4DFAB932F9D}"/>
+                <a16:creationId xmlns:a16="http://schemas.microsoft.com/office/drawing/2014/main" id="{705B56BD-7557-0A4C-9993-BA9EA956DF6E}"/>
               </a:ext>
             </a:extLst>
           </p:cNvPr>
@@ -10151,10 +9958,10 @@
         </p:grpSpPr>
         <p:sp>
           <p:nvSpPr>
-            <p:cNvPr id="10" name="Rectangle 9">
+            <p:cNvPr id="15" name="Rectangle 14">
               <a:extLst>
                 <a:ext uri="{FF2B5EF4-FFF2-40B4-BE49-F238E27FC236}">
-                  <a16:creationId xmlns:a16="http://schemas.microsoft.com/office/drawing/2014/main" id="{5E2D43E7-24F6-3D47-9CE4-663E9E1A9F16}"/>
+                  <a16:creationId xmlns:a16="http://schemas.microsoft.com/office/drawing/2014/main" id="{B7F9A7F2-407D-AF40-9BD5-DD971AC0E5D0}"/>
                 </a:ext>
               </a:extLst>
             </p:cNvPr>
@@ -10211,10 +10018,10 @@
         </p:sp>
         <p:pic>
           <p:nvPicPr>
-            <p:cNvPr id="11" name="Picture 21" descr="CL_logo_RGB_inv.emf">
+            <p:cNvPr id="16" name="Picture 21" descr="CL_logo_RGB_inv.emf">
               <a:extLst>
                 <a:ext uri="{FF2B5EF4-FFF2-40B4-BE49-F238E27FC236}">
-                  <a16:creationId xmlns:a16="http://schemas.microsoft.com/office/drawing/2014/main" id="{8291F311-0AE0-7C49-A67C-D2202EB00416}"/>
+                  <a16:creationId xmlns:a16="http://schemas.microsoft.com/office/drawing/2014/main" id="{A65CA6C1-05A7-AE46-9D00-B50F6312A59B}"/>
                 </a:ext>
               </a:extLst>
             </p:cNvPr>
@@ -10224,7 +10031,7 @@
             <p:nvPr/>
           </p:nvPicPr>
           <p:blipFill>
-            <a:blip r:embed="rId3">
+            <a:blip r:embed="rId2">
               <a:extLst>
                 <a:ext uri="{28A0092B-C50C-407E-A947-70E740481C1C}">
                   <a14:useLocalDpi xmlns:a14="http://schemas.microsoft.com/office/drawing/2010/main" val="0"/>
@@ -10270,10 +10077,45 @@
           </p:spPr>
         </p:pic>
       </p:grpSp>
+      <p:sp>
+        <p:nvSpPr>
+          <p:cNvPr id="17" name="Title 5">
+            <a:extLst>
+              <a:ext uri="{FF2B5EF4-FFF2-40B4-BE49-F238E27FC236}">
+                <a16:creationId xmlns:a16="http://schemas.microsoft.com/office/drawing/2014/main" id="{D40FBEE0-7A2A-4744-9B80-469670DC44D6}"/>
+              </a:ext>
+            </a:extLst>
+          </p:cNvPr>
+          <p:cNvSpPr>
+            <a:spLocks noGrp="1"/>
+          </p:cNvSpPr>
+          <p:nvPr>
+            <p:ph type="title"/>
+          </p:nvPr>
+        </p:nvSpPr>
+        <p:spPr>
+          <a:xfrm>
+            <a:off x="228599" y="228492"/>
+            <a:ext cx="11711151" cy="452546"/>
+          </a:xfrm>
+        </p:spPr>
+        <p:txBody>
+          <a:bodyPr/>
+          <a:lstStyle/>
+          <a:p>
+            <a:r>
+              <a:rPr lang="en-US" b="1" dirty="0">
+                <a:latin typeface="Helvetica" pitchFamily="2" charset="0"/>
+              </a:rPr>
+              <a:t>Objectives</a:t>
+            </a:r>
+          </a:p>
+        </p:txBody>
+      </p:sp>
     </p:spTree>
     <p:extLst>
       <p:ext uri="{BB962C8B-B14F-4D97-AF65-F5344CB8AC3E}">
-        <p14:creationId xmlns:p14="http://schemas.microsoft.com/office/powerpoint/2010/main" val="938391024"/>
+        <p14:creationId xmlns:p14="http://schemas.microsoft.com/office/powerpoint/2010/main" val="1437543038"/>
       </p:ext>
     </p:extLst>
   </p:cSld>
@@ -10301,7 +10143,7 @@
                             </p:stCondLst>
                             <p:childTnLst>
                               <p:par>
-                                <p:cTn id="5" presetID="1" presetClass="exit" presetSubtype="0" fill="hold" grpId="0" nodeType="clickEffect">
+                                <p:cTn id="5" presetID="1" presetClass="entr" presetSubtype="0" fill="hold" grpId="0" nodeType="clickEffect">
                                   <p:stCondLst>
                                     <p:cond delay="0"/>
                                   </p:stCondLst>
@@ -10314,14 +10156,14 @@
                                           </p:stCondLst>
                                         </p:cTn>
                                         <p:tgtEl>
-                                          <p:spTgt spid="4"/>
+                                          <p:spTgt spid="12"/>
                                         </p:tgtEl>
                                         <p:attrNameLst>
                                           <p:attrName>style.visibility</p:attrName>
                                         </p:attrNameLst>
                                       </p:cBhvr>
                                       <p:to>
-                                        <p:strVal val="hidden"/>
+                                        <p:strVal val="visible"/>
                                       </p:to>
                                     </p:set>
                                   </p:childTnLst>
@@ -10346,7 +10188,7 @@
                             </p:stCondLst>
                             <p:childTnLst>
                               <p:par>
-                                <p:cTn id="9" presetID="1" presetClass="exit" presetSubtype="0" fill="hold" grpId="0" nodeType="clickEffect">
+                                <p:cTn id="9" presetID="1" presetClass="entr" presetSubtype="0" fill="hold" grpId="0" nodeType="clickEffect">
                                   <p:stCondLst>
                                     <p:cond delay="0"/>
                                   </p:stCondLst>
@@ -10359,14 +10201,59 @@
                                           </p:stCondLst>
                                         </p:cTn>
                                         <p:tgtEl>
-                                          <p:spTgt spid="9"/>
+                                          <p:spTgt spid="10"/>
                                         </p:tgtEl>
                                         <p:attrNameLst>
                                           <p:attrName>style.visibility</p:attrName>
                                         </p:attrNameLst>
                                       </p:cBhvr>
                                       <p:to>
-                                        <p:strVal val="hidden"/>
+                                        <p:strVal val="visible"/>
+                                      </p:to>
+                                    </p:set>
+                                  </p:childTnLst>
+                                </p:cTn>
+                              </p:par>
+                            </p:childTnLst>
+                          </p:cTn>
+                        </p:par>
+                      </p:childTnLst>
+                    </p:cTn>
+                  </p:par>
+                  <p:par>
+                    <p:cTn id="11" fill="hold">
+                      <p:stCondLst>
+                        <p:cond delay="indefinite"/>
+                      </p:stCondLst>
+                      <p:childTnLst>
+                        <p:par>
+                          <p:cTn id="12" fill="hold">
+                            <p:stCondLst>
+                              <p:cond delay="0"/>
+                            </p:stCondLst>
+                            <p:childTnLst>
+                              <p:par>
+                                <p:cTn id="13" presetID="1" presetClass="entr" presetSubtype="0" fill="hold" grpId="0" nodeType="clickEffect">
+                                  <p:stCondLst>
+                                    <p:cond delay="0"/>
+                                  </p:stCondLst>
+                                  <p:childTnLst>
+                                    <p:set>
+                                      <p:cBhvr>
+                                        <p:cTn id="14" dur="1" fill="hold">
+                                          <p:stCondLst>
+                                            <p:cond delay="0"/>
+                                          </p:stCondLst>
+                                        </p:cTn>
+                                        <p:tgtEl>
+                                          <p:spTgt spid="13"/>
+                                        </p:tgtEl>
+                                        <p:attrNameLst>
+                                          <p:attrName>style.visibility</p:attrName>
+                                        </p:attrNameLst>
+                                      </p:cBhvr>
+                                      <p:to>
+                                        <p:strVal val="visible"/>
                                       </p:to>
                                     </p:set>
                                   </p:childTnLst>
@@ -10400,8 +10287,9 @@
       </p:par>
     </p:tnLst>
     <p:bldLst>
-      <p:bldP spid="4" grpId="0" animBg="1"/>
-      <p:bldP spid="9" grpId="0" animBg="1"/>
+      <p:bldP spid="10" grpId="0"/>
+      <p:bldP spid="12" grpId="0"/>
+      <p:bldP spid="13" grpId="0"/>
     </p:bldLst>
   </p:timing>
 </p:sld>

</xml_diff>